<commit_message>
Add Shaw‘s student ID
</commit_message>
<xml_diff>
--- a/撕新闻.pptx
+++ b/撕新闻.pptx
@@ -11860,11 +11860,6 @@
               </a:rPr>
               <a:t>1200012713</a:t>
             </a:r>
-            <a:endParaRPr lang="en-US" altLang="zh-CN" i="0" dirty="0" smtClean="0">
-              <a:solidFill>
-                <a:schemeClr val="accent1"/>
-              </a:solidFill>
-            </a:endParaRPr>
           </a:p>
           <a:p>
             <a:r>
@@ -11978,7 +11973,25 @@
                   <a:schemeClr val="accent1"/>
                 </a:solidFill>
               </a:rPr>
-              <a:t>肖</a:t>
+              <a:t>肖倾城</a:t>
+            </a:r>
+            <a:r>
+              <a:rPr lang="en-US" altLang="zh-CN" i="0" smtClean="0">
+                <a:solidFill>
+                  <a:schemeClr val="accent1"/>
+                </a:solidFill>
+              </a:rPr>
+              <a:t>1200018706</a:t>
+            </a:r>
+          </a:p>
+          <a:p>
+            <a:r>
+              <a:rPr lang="zh-CN" altLang="en-US" i="0" smtClean="0">
+                <a:solidFill>
+                  <a:schemeClr val="accent1"/>
+                </a:solidFill>
+              </a:rPr>
+              <a:t>王</a:t>
             </a:r>
             <a:r>
               <a:rPr lang="zh-CN" altLang="en-US" i="0" dirty="0" smtClean="0">
@@ -11986,62 +11999,7 @@
                   <a:schemeClr val="accent1"/>
                 </a:solidFill>
               </a:rPr>
-              <a:t>倾</a:t>
-            </a:r>
-            <a:r>
-              <a:rPr lang="zh-CN" altLang="en-US" i="0" dirty="0" smtClean="0">
-                <a:solidFill>
-                  <a:schemeClr val="accent1"/>
-                </a:solidFill>
-              </a:rPr>
-              <a:t>城</a:t>
-            </a:r>
-            <a:r>
-              <a:rPr lang="en-US" altLang="zh-CN" i="0" dirty="0" smtClean="0">
-                <a:solidFill>
-                  <a:schemeClr val="accent1"/>
-                </a:solidFill>
-              </a:rPr>
-              <a:t>120001</a:t>
-            </a:r>
-            <a:r>
-              <a:rPr lang="zh-CN" altLang="en-US" i="0" dirty="0" smtClean="0">
-                <a:solidFill>
-                  <a:schemeClr val="accent1"/>
-                </a:solidFill>
-              </a:rPr>
-              <a:t>****</a:t>
-            </a:r>
-            <a:endParaRPr lang="en-US" altLang="zh-CN" i="0" dirty="0" smtClean="0">
-              <a:solidFill>
-                <a:schemeClr val="accent1"/>
-              </a:solidFill>
-            </a:endParaRPr>
-          </a:p>
-          <a:p>
-            <a:r>
-              <a:rPr lang="zh-CN" altLang="en-US" i="0" dirty="0" smtClean="0">
-                <a:solidFill>
-                  <a:schemeClr val="accent1"/>
-                </a:solidFill>
-              </a:rPr>
-              <a:t>王</a:t>
-            </a:r>
-            <a:r>
-              <a:rPr lang="zh-CN" altLang="en-US" i="0" dirty="0" smtClean="0">
-                <a:solidFill>
-                  <a:schemeClr val="accent1"/>
-                </a:solidFill>
-              </a:rPr>
-              <a:t>润</a:t>
-            </a:r>
-            <a:r>
-              <a:rPr lang="zh-CN" altLang="en-US" i="0" dirty="0" smtClean="0">
-                <a:solidFill>
-                  <a:schemeClr val="accent1"/>
-                </a:solidFill>
-              </a:rPr>
-              <a:t>辉</a:t>
+              <a:t>润辉</a:t>
             </a:r>
             <a:r>
               <a:rPr lang="en-US" altLang="zh-CN" i="0" dirty="0" smtClean="0">

</xml_diff>